<commit_message>
fixed a few things on ppt
</commit_message>
<xml_diff>
--- a/FinalProject_v2.pptx
+++ b/FinalProject_v2.pptx
@@ -5867,10 +5867,9 @@
           <a:p>
             <a:pPr algn="ctr"/>
             <a:r>
-              <a:rPr lang="en-US" dirty="0" smtClean="0"/>
+              <a:rPr lang="en-US" dirty="0"/>
               <a:t>Inventory Database</a:t>
             </a:r>
-            <a:endParaRPr lang="en-US" dirty="0"/>
           </a:p>
         </p:txBody>
       </p:sp>
@@ -6087,25 +6086,8 @@
                   </a:schemeClr>
                 </a:solidFill>
               </a:rPr>
-              <a:t>Drink </a:t>
-            </a:r>
-            <a:r>
-              <a:rPr lang="en-US" dirty="0" smtClean="0">
-                <a:solidFill>
-                  <a:schemeClr val="accent4">
-                    <a:lumMod val="50000"/>
-                  </a:schemeClr>
-                </a:solidFill>
-              </a:rPr>
-              <a:t>Quantities</a:t>
-            </a:r>
-            <a:endParaRPr lang="en-US" dirty="0">
-              <a:solidFill>
-                <a:schemeClr val="accent4">
-                  <a:lumMod val="50000"/>
-                </a:schemeClr>
-              </a:solidFill>
-            </a:endParaRPr>
+              <a:t>Drink Quantities</a:t>
+            </a:r>
           </a:p>
         </p:txBody>
       </p:sp>
@@ -7310,7 +7292,7 @@
           <a:p>
             <a:pPr algn="ctr"/>
             <a:r>
-              <a:rPr lang="en-US" b="1" dirty="0" smtClean="0">
+              <a:rPr lang="en-US" b="1" dirty="0">
                 <a:solidFill>
                   <a:schemeClr val="accent5"/>
                 </a:solidFill>
@@ -7318,25 +7300,20 @@
               <a:t>Inventory</a:t>
             </a:r>
             <a:br>
-              <a:rPr lang="en-US" b="1" dirty="0" smtClean="0">
+              <a:rPr lang="en-US" b="1" dirty="0">
                 <a:solidFill>
                   <a:schemeClr val="accent5"/>
                 </a:solidFill>
               </a:rPr>
             </a:br>
             <a:r>
-              <a:rPr lang="en-US" b="1" dirty="0" smtClean="0">
+              <a:rPr lang="en-US" b="1" dirty="0">
                 <a:solidFill>
                   <a:schemeClr val="accent5"/>
                 </a:solidFill>
               </a:rPr>
               <a:t>Database</a:t>
             </a:r>
-            <a:endParaRPr lang="en-US" b="1" dirty="0">
-              <a:solidFill>
-                <a:schemeClr val="accent5"/>
-              </a:solidFill>
-            </a:endParaRPr>
           </a:p>
         </p:txBody>
       </p:sp>
@@ -9459,18 +9436,13 @@
               <a:t>&lt;&lt;interface&gt;&gt; </a:t>
             </a:r>
             <a:r>
-              <a:rPr lang="en-US" b="1" dirty="0" smtClean="0">
+              <a:rPr lang="en-US" b="1" dirty="0">
                 <a:solidFill>
                   <a:schemeClr val="accent5"/>
                 </a:solidFill>
               </a:rPr>
               <a:t>Garnish</a:t>
             </a:r>
-            <a:endParaRPr lang="en-US" b="1" dirty="0">
-              <a:solidFill>
-                <a:schemeClr val="accent5"/>
-              </a:solidFill>
-            </a:endParaRPr>
           </a:p>
         </p:txBody>
       </p:sp>
@@ -9586,7 +9558,7 @@
               <a:t>&gt;&gt; </a:t>
             </a:r>
             <a:r>
-              <a:rPr kumimoji="0" lang="en-US" sz="1800" b="1" i="0" u="none" strike="noStrike" kern="1200" cap="none" spc="0" normalizeH="0" baseline="0" noProof="0" dirty="0" smtClean="0">
+              <a:rPr kumimoji="0" lang="en-US" sz="1800" b="1" i="0" u="none" strike="noStrike" kern="1200" cap="none" spc="0" normalizeH="0" baseline="0" noProof="0" dirty="0">
                 <a:ln>
                   <a:noFill/>
                 </a:ln>
@@ -9602,20 +9574,6 @@
               </a:rPr>
               <a:t>Glass</a:t>
             </a:r>
-            <a:endParaRPr kumimoji="0" lang="en-US" sz="1800" b="1" i="0" u="none" strike="noStrike" kern="1200" cap="none" spc="0" normalizeH="0" baseline="0" noProof="0" dirty="0">
-              <a:ln>
-                <a:noFill/>
-              </a:ln>
-              <a:solidFill>
-                <a:srgbClr val="4472C4"/>
-              </a:solidFill>
-              <a:effectLst/>
-              <a:uLnTx/>
-              <a:uFillTx/>
-              <a:latin typeface="Calibri" panose="020F0502020204030204"/>
-              <a:ea typeface="+mn-ea"/>
-              <a:cs typeface="+mn-cs"/>
-            </a:endParaRPr>
           </a:p>
         </p:txBody>
       </p:sp>
@@ -9731,7 +9689,7 @@
               <a:t>&gt;&gt; </a:t>
             </a:r>
             <a:r>
-              <a:rPr kumimoji="0" lang="en-US" sz="1800" b="1" i="0" u="none" strike="noStrike" kern="1200" cap="none" spc="0" normalizeH="0" baseline="0" noProof="0" dirty="0" smtClean="0">
+              <a:rPr kumimoji="0" lang="en-US" sz="1800" b="1" i="0" u="none" strike="noStrike" kern="1200" cap="none" spc="0" normalizeH="0" baseline="0" noProof="0" dirty="0">
                 <a:ln>
                   <a:noFill/>
                 </a:ln>
@@ -9747,20 +9705,6 @@
               </a:rPr>
               <a:t>Ice</a:t>
             </a:r>
-            <a:endParaRPr kumimoji="0" lang="en-US" sz="1800" b="1" i="0" u="none" strike="noStrike" kern="1200" cap="none" spc="0" normalizeH="0" baseline="0" noProof="0" dirty="0">
-              <a:ln>
-                <a:noFill/>
-              </a:ln>
-              <a:solidFill>
-                <a:srgbClr val="4472C4"/>
-              </a:solidFill>
-              <a:effectLst/>
-              <a:uLnTx/>
-              <a:uFillTx/>
-              <a:latin typeface="Calibri" panose="020F0502020204030204"/>
-              <a:ea typeface="+mn-ea"/>
-              <a:cs typeface="+mn-cs"/>
-            </a:endParaRPr>
           </a:p>
         </p:txBody>
       </p:sp>
@@ -9841,6 +9785,116 @@
               </a:rPr>
               <a:t>Builder Pattern  Used To Make Mixed Drinks</a:t>
             </a:r>
+          </a:p>
+        </p:txBody>
+      </p:sp>
+      <p:sp>
+        <p:nvSpPr>
+          <p:cNvPr id="50" name="Rectangle 49">
+            <a:extLst>
+              <a:ext uri="{FF2B5EF4-FFF2-40B4-BE49-F238E27FC236}">
+                <a16:creationId xmlns:a16="http://schemas.microsoft.com/office/drawing/2014/main" id="{03A680F2-5D2D-41E3-821B-592886515988}"/>
+              </a:ext>
+            </a:extLst>
+          </p:cNvPr>
+          <p:cNvSpPr/>
+          <p:nvPr/>
+        </p:nvSpPr>
+        <p:spPr>
+          <a:xfrm>
+            <a:off x="3612090" y="2333060"/>
+            <a:ext cx="1354364" cy="642257"/>
+          </a:xfrm>
+          <a:prstGeom prst="rect">
+            <a:avLst/>
+          </a:prstGeom>
+          <a:solidFill>
+            <a:schemeClr val="accent4"/>
+          </a:solidFill>
+          <a:ln w="57150">
+            <a:solidFill>
+              <a:schemeClr val="accent4"/>
+            </a:solidFill>
+          </a:ln>
+        </p:spPr>
+        <p:style>
+          <a:lnRef idx="2">
+            <a:schemeClr val="accent1">
+              <a:shade val="50000"/>
+            </a:schemeClr>
+          </a:lnRef>
+          <a:fillRef idx="1">
+            <a:schemeClr val="accent1"/>
+          </a:fillRef>
+          <a:effectRef idx="0">
+            <a:schemeClr val="accent1"/>
+          </a:effectRef>
+          <a:fontRef idx="minor">
+            <a:schemeClr val="lt1"/>
+          </a:fontRef>
+        </p:style>
+        <p:txBody>
+          <a:bodyPr rtlCol="0" anchor="ctr"/>
+          <a:lstStyle/>
+          <a:p>
+            <a:pPr algn="ctr"/>
+            <a:r>
+              <a:rPr lang="en-US" b="1" dirty="0">
+                <a:solidFill>
+                  <a:schemeClr val="accent5"/>
+                </a:solidFill>
+              </a:rPr>
+              <a:t>Process Orders </a:t>
+            </a:r>
+          </a:p>
+        </p:txBody>
+      </p:sp>
+      <p:sp>
+        <p:nvSpPr>
+          <p:cNvPr id="51" name="Arrow: Right 50">
+            <a:extLst>
+              <a:ext uri="{FF2B5EF4-FFF2-40B4-BE49-F238E27FC236}">
+                <a16:creationId xmlns:a16="http://schemas.microsoft.com/office/drawing/2014/main" id="{A45B451B-89B0-4F7A-9A67-72B52E770F8A}"/>
+              </a:ext>
+            </a:extLst>
+          </p:cNvPr>
+          <p:cNvSpPr/>
+          <p:nvPr/>
+        </p:nvSpPr>
+        <p:spPr>
+          <a:xfrm rot="5400000">
+            <a:off x="4120136" y="1972317"/>
+            <a:ext cx="271236" cy="321129"/>
+          </a:xfrm>
+          <a:prstGeom prst="rightArrow">
+            <a:avLst/>
+          </a:prstGeom>
+          <a:ln>
+            <a:noFill/>
+          </a:ln>
+        </p:spPr>
+        <p:style>
+          <a:lnRef idx="2">
+            <a:schemeClr val="accent5">
+              <a:shade val="50000"/>
+            </a:schemeClr>
+          </a:lnRef>
+          <a:fillRef idx="1">
+            <a:schemeClr val="accent5"/>
+          </a:fillRef>
+          <a:effectRef idx="0">
+            <a:schemeClr val="accent5"/>
+          </a:effectRef>
+          <a:fontRef idx="minor">
+            <a:schemeClr val="lt1"/>
+          </a:fontRef>
+        </p:style>
+        <p:txBody>
+          <a:bodyPr rtlCol="0" anchor="ctr"/>
+          <a:lstStyle/>
+          <a:p>
+            <a:pPr algn="ctr"/>
+            <a:endParaRPr lang="en-US" dirty="0"/>
           </a:p>
         </p:txBody>
       </p:sp>

</xml_diff>